<commit_message>
Created Bookdown for Workshop
</commit_message>
<xml_diff>
--- a/MiCM_IntroToR.pptx
+++ b/MiCM_IntroToR.pptx
@@ -4527,7 +4527,7 @@
   <pc:docChgLst>
     <pc:chgData name="Adrien Osakwe" userId="7a3e290c-eb83-484b-8e3d-d46ef2333477" providerId="ADAL" clId="{6FBBC003-63E5-4DAA-8405-CD7EEDECBC2E}"/>
     <pc:docChg chg="undo custSel addSld delSld modSld sldOrd modSection">
-      <pc:chgData name="Adrien Osakwe" userId="7a3e290c-eb83-484b-8e3d-d46ef2333477" providerId="ADAL" clId="{6FBBC003-63E5-4DAA-8405-CD7EEDECBC2E}" dt="2024-02-14T04:50:25.132" v="3471" actId="113"/>
+      <pc:chgData name="Adrien Osakwe" userId="7a3e290c-eb83-484b-8e3d-d46ef2333477" providerId="ADAL" clId="{6FBBC003-63E5-4DAA-8405-CD7EEDECBC2E}" dt="2024-02-14T16:01:30.496" v="3472" actId="729"/>
       <pc:docMkLst>
         <pc:docMk/>
       </pc:docMkLst>
@@ -5798,8 +5798,8 @@
           </ac:spMkLst>
         </pc:spChg>
       </pc:sldChg>
-      <pc:sldChg chg="modSp new mod">
-        <pc:chgData name="Adrien Osakwe" userId="7a3e290c-eb83-484b-8e3d-d46ef2333477" providerId="ADAL" clId="{6FBBC003-63E5-4DAA-8405-CD7EEDECBC2E}" dt="2024-02-14T04:50:12.729" v="3470" actId="113"/>
+      <pc:sldChg chg="modSp new mod modShow">
+        <pc:chgData name="Adrien Osakwe" userId="7a3e290c-eb83-484b-8e3d-d46ef2333477" providerId="ADAL" clId="{6FBBC003-63E5-4DAA-8405-CD7EEDECBC2E}" dt="2024-02-14T16:01:30.496" v="3472" actId="729"/>
         <pc:sldMkLst>
           <pc:docMk/>
           <pc:sldMk cId="1154444114" sldId="463"/>
@@ -6100,7 +6100,7 @@
           <a:p>
             <a:fld id="{217E5156-1B5D-054E-B5B2-E1B1BA160252}" type="datetimeFigureOut">
               <a:rPr lang="fr-FR" smtClean="0"/>
-              <a:t>13/02/2024</a:t>
+              <a:t>14/02/2024</a:t>
             </a:fld>
             <a:endParaRPr lang="fr-FR"/>
           </a:p>
@@ -17601,7 +17601,7 @@
 </file>
 
 <file path=ppt/slides/slide28.xml><?xml version="1.0" encoding="utf-8"?>
-<p:sld xmlns:a="http://schemas.openxmlformats.org/drawingml/2006/main" xmlns:r="http://schemas.openxmlformats.org/officeDocument/2006/relationships" xmlns:p="http://schemas.openxmlformats.org/presentationml/2006/main">
+<p:sld xmlns:a="http://schemas.openxmlformats.org/drawingml/2006/main" xmlns:r="http://schemas.openxmlformats.org/officeDocument/2006/relationships" xmlns:p="http://schemas.openxmlformats.org/presentationml/2006/main" show="0">
   <p:cSld>
     <p:spTree>
       <p:nvGrpSpPr>

</xml_diff>